<commit_message>
Updated the tutorials for Day 3
</commit_message>
<xml_diff>
--- a/python_fundamentals/day_three/tutorials/Day 3 - Part Two.pptx
+++ b/python_fundamentals/day_three/tutorials/Day 3 - Part Two.pptx
@@ -18,8 +18,6 @@
     <p:sldId id="263" r:id="rId13"/>
     <p:sldId id="264" r:id="rId14"/>
     <p:sldId id="265" r:id="rId15"/>
-    <p:sldId id="266" r:id="rId16"/>
-    <p:sldId id="267" r:id="rId17"/>
   </p:sldIdLst>
   <p:sldSz cy="5143500" cx="9144000"/>
   <p:notesSz cx="6858000" cy="9144000"/>
@@ -801,7 +799,7 @@
   <p:cSld>
     <p:spTree>
       <p:nvGrpSpPr>
-        <p:cNvPr id="108" name="Shape 108"/>
+        <p:cNvPr id="109" name="Shape 109"/>
         <p:cNvGrpSpPr/>
         <p:nvPr/>
       </p:nvGrpSpPr>
@@ -815,7 +813,7 @@
       </p:grpSpPr>
       <p:sp>
         <p:nvSpPr>
-          <p:cNvPr id="109" name="Google Shape;109;g2258d86762a_0_48:notes"/>
+          <p:cNvPr id="110" name="Google Shape;110;g2258d86762a_0_54:notes"/>
           <p:cNvSpPr/>
           <p:nvPr>
             <p:ph idx="2" type="sldImg"/>
@@ -850,205 +848,7 @@
       </p:sp>
       <p:sp>
         <p:nvSpPr>
-          <p:cNvPr id="110" name="Google Shape;110;g2258d86762a_0_48:notes"/>
-          <p:cNvSpPr txBox="1"/>
-          <p:nvPr>
-            <p:ph idx="1" type="body"/>
-          </p:nvPr>
-        </p:nvSpPr>
-        <p:spPr>
-          <a:xfrm>
-            <a:off x="685800" y="4343400"/>
-            <a:ext cx="5486400" cy="4114800"/>
-          </a:xfrm>
-          <a:prstGeom prst="rect">
-            <a:avLst/>
-          </a:prstGeom>
-        </p:spPr>
-        <p:txBody>
-          <a:bodyPr anchorCtr="0" anchor="t" bIns="91425" lIns="91425" spcFirstLastPara="1" rIns="91425" wrap="square" tIns="91425">
-            <a:noAutofit/>
-          </a:bodyPr>
-          <a:lstStyle/>
-          <a:p>
-            <a:pPr indent="0" lvl="0" marL="0" rtl="0" algn="l">
-              <a:spcBef>
-                <a:spcPts val="0"/>
-              </a:spcBef>
-              <a:spcAft>
-                <a:spcPts val="0"/>
-              </a:spcAft>
-              <a:buNone/>
-            </a:pPr>
-            <a:r>
-              <a:t/>
-            </a:r>
-            <a:endParaRPr/>
-          </a:p>
-        </p:txBody>
-      </p:sp>
-    </p:spTree>
-  </p:cSld>
-  <p:clrMapOvr>
-    <a:masterClrMapping/>
-  </p:clrMapOvr>
-</p:notes>
-</file>
-
-<file path=ppt/notesSlides/notesSlide11.xml><?xml version="1.0" encoding="utf-8"?>
-<p:notes xmlns:a="http://schemas.openxmlformats.org/drawingml/2006/main" xmlns:r="http://schemas.openxmlformats.org/officeDocument/2006/relationships" xmlns:mc="http://schemas.openxmlformats.org/markup-compatibility/2006" xmlns:mv="urn:schemas-microsoft-com:mac:vml" xmlns:p="http://schemas.openxmlformats.org/presentationml/2006/main" xmlns:c="http://schemas.openxmlformats.org/drawingml/2006/chart" xmlns:dgm="http://schemas.openxmlformats.org/drawingml/2006/diagram" xmlns:o="urn:schemas-microsoft-com:office:office" xmlns:v="urn:schemas-microsoft-com:vml" xmlns:pvml="urn:schemas-microsoft-com:office:powerpoint" xmlns:com="http://schemas.openxmlformats.org/drawingml/2006/compatibility" xmlns:p14="http://schemas.microsoft.com/office/powerpoint/2010/main" xmlns:p15="http://schemas.microsoft.com/office/powerpoint/2012/main" xmlns:ahyp="http://schemas.microsoft.com/office/drawing/2018/hyperlinkcolor" showMasterPhAnim="0" showMasterSp="0">
-  <p:cSld>
-    <p:spTree>
-      <p:nvGrpSpPr>
-        <p:cNvPr id="115" name="Shape 115"/>
-        <p:cNvGrpSpPr/>
-        <p:nvPr/>
-      </p:nvGrpSpPr>
-      <p:grpSpPr>
-        <a:xfrm>
-          <a:off x="0" y="0"/>
-          <a:ext cx="0" cy="0"/>
-          <a:chOff x="0" y="0"/>
-          <a:chExt cx="0" cy="0"/>
-        </a:xfrm>
-      </p:grpSpPr>
-      <p:sp>
-        <p:nvSpPr>
-          <p:cNvPr id="116" name="Google Shape;116;g2258d86762a_0_54:notes"/>
-          <p:cNvSpPr/>
-          <p:nvPr>
-            <p:ph idx="2" type="sldImg"/>
-          </p:nvPr>
-        </p:nvSpPr>
-        <p:spPr>
-          <a:xfrm>
-            <a:off x="381300" y="685800"/>
-            <a:ext cx="6096000" cy="3429000"/>
-          </a:xfrm>
-          <a:custGeom>
-            <a:rect b="b" l="l" r="r" t="t"/>
-            <a:pathLst>
-              <a:path extrusionOk="0" h="120000" w="120000">
-                <a:moveTo>
-                  <a:pt x="0" y="0"/>
-                </a:moveTo>
-                <a:lnTo>
-                  <a:pt x="120000" y="0"/>
-                </a:lnTo>
-                <a:lnTo>
-                  <a:pt x="120000" y="120000"/>
-                </a:lnTo>
-                <a:lnTo>
-                  <a:pt x="0" y="120000"/>
-                </a:lnTo>
-                <a:close/>
-              </a:path>
-            </a:pathLst>
-          </a:custGeom>
-        </p:spPr>
-      </p:sp>
-      <p:sp>
-        <p:nvSpPr>
-          <p:cNvPr id="117" name="Google Shape;117;g2258d86762a_0_54:notes"/>
-          <p:cNvSpPr txBox="1"/>
-          <p:nvPr>
-            <p:ph idx="1" type="body"/>
-          </p:nvPr>
-        </p:nvSpPr>
-        <p:spPr>
-          <a:xfrm>
-            <a:off x="685800" y="4343400"/>
-            <a:ext cx="5486400" cy="4114800"/>
-          </a:xfrm>
-          <a:prstGeom prst="rect">
-            <a:avLst/>
-          </a:prstGeom>
-        </p:spPr>
-        <p:txBody>
-          <a:bodyPr anchorCtr="0" anchor="t" bIns="91425" lIns="91425" spcFirstLastPara="1" rIns="91425" wrap="square" tIns="91425">
-            <a:noAutofit/>
-          </a:bodyPr>
-          <a:lstStyle/>
-          <a:p>
-            <a:pPr indent="0" lvl="0" marL="0" rtl="0" algn="l">
-              <a:spcBef>
-                <a:spcPts val="0"/>
-              </a:spcBef>
-              <a:spcAft>
-                <a:spcPts val="0"/>
-              </a:spcAft>
-              <a:buNone/>
-            </a:pPr>
-            <a:r>
-              <a:t/>
-            </a:r>
-            <a:endParaRPr/>
-          </a:p>
-        </p:txBody>
-      </p:sp>
-    </p:spTree>
-  </p:cSld>
-  <p:clrMapOvr>
-    <a:masterClrMapping/>
-  </p:clrMapOvr>
-</p:notes>
-</file>
-
-<file path=ppt/notesSlides/notesSlide12.xml><?xml version="1.0" encoding="utf-8"?>
-<p:notes xmlns:a="http://schemas.openxmlformats.org/drawingml/2006/main" xmlns:r="http://schemas.openxmlformats.org/officeDocument/2006/relationships" xmlns:mc="http://schemas.openxmlformats.org/markup-compatibility/2006" xmlns:mv="urn:schemas-microsoft-com:mac:vml" xmlns:p="http://schemas.openxmlformats.org/presentationml/2006/main" xmlns:c="http://schemas.openxmlformats.org/drawingml/2006/chart" xmlns:dgm="http://schemas.openxmlformats.org/drawingml/2006/diagram" xmlns:o="urn:schemas-microsoft-com:office:office" xmlns:v="urn:schemas-microsoft-com:vml" xmlns:pvml="urn:schemas-microsoft-com:office:powerpoint" xmlns:com="http://schemas.openxmlformats.org/drawingml/2006/compatibility" xmlns:p14="http://schemas.microsoft.com/office/powerpoint/2010/main" xmlns:p15="http://schemas.microsoft.com/office/powerpoint/2012/main" xmlns:ahyp="http://schemas.microsoft.com/office/drawing/2018/hyperlinkcolor" showMasterPhAnim="0" showMasterSp="0">
-  <p:cSld>
-    <p:spTree>
-      <p:nvGrpSpPr>
-        <p:cNvPr id="122" name="Shape 122"/>
-        <p:cNvGrpSpPr/>
-        <p:nvPr/>
-      </p:nvGrpSpPr>
-      <p:grpSpPr>
-        <a:xfrm>
-          <a:off x="0" y="0"/>
-          <a:ext cx="0" cy="0"/>
-          <a:chOff x="0" y="0"/>
-          <a:chExt cx="0" cy="0"/>
-        </a:xfrm>
-      </p:grpSpPr>
-      <p:sp>
-        <p:nvSpPr>
-          <p:cNvPr id="123" name="Google Shape;123;g2258d86762a_0_72:notes"/>
-          <p:cNvSpPr/>
-          <p:nvPr>
-            <p:ph idx="2" type="sldImg"/>
-          </p:nvPr>
-        </p:nvSpPr>
-        <p:spPr>
-          <a:xfrm>
-            <a:off x="381300" y="685800"/>
-            <a:ext cx="6096000" cy="3429000"/>
-          </a:xfrm>
-          <a:custGeom>
-            <a:rect b="b" l="l" r="r" t="t"/>
-            <a:pathLst>
-              <a:path extrusionOk="0" h="120000" w="120000">
-                <a:moveTo>
-                  <a:pt x="0" y="0"/>
-                </a:moveTo>
-                <a:lnTo>
-                  <a:pt x="120000" y="0"/>
-                </a:lnTo>
-                <a:lnTo>
-                  <a:pt x="120000" y="120000"/>
-                </a:lnTo>
-                <a:lnTo>
-                  <a:pt x="0" y="120000"/>
-                </a:lnTo>
-                <a:close/>
-              </a:path>
-            </a:pathLst>
-          </a:custGeom>
-        </p:spPr>
-      </p:sp>
-      <p:sp>
-        <p:nvSpPr>
-          <p:cNvPr id="124" name="Google Shape;124;g2258d86762a_0_72:notes"/>
+          <p:cNvPr id="111" name="Google Shape;111;g2258d86762a_0_54:notes"/>
           <p:cNvSpPr txBox="1"/>
           <p:nvPr>
             <p:ph idx="1" type="body"/>
@@ -1706,7 +1506,7 @@
       </p:grpSpPr>
       <p:sp>
         <p:nvSpPr>
-          <p:cNvPr id="97" name="Google Shape;97;g2258d86762a_0_36:notes"/>
+          <p:cNvPr id="97" name="Google Shape;97;g2258d86762a_0_42:notes"/>
           <p:cNvSpPr/>
           <p:nvPr>
             <p:ph idx="2" type="sldImg"/>
@@ -1741,7 +1541,7 @@
       </p:sp>
       <p:sp>
         <p:nvSpPr>
-          <p:cNvPr id="98" name="Google Shape;98;g2258d86762a_0_36:notes"/>
+          <p:cNvPr id="98" name="Google Shape;98;g2258d86762a_0_42:notes"/>
           <p:cNvSpPr txBox="1"/>
           <p:nvPr>
             <p:ph idx="1" type="body"/>
@@ -1805,7 +1605,7 @@
       </p:grpSpPr>
       <p:sp>
         <p:nvSpPr>
-          <p:cNvPr id="103" name="Google Shape;103;g2258d86762a_0_42:notes"/>
+          <p:cNvPr id="103" name="Google Shape;103;g2258d86762a_0_48:notes"/>
           <p:cNvSpPr/>
           <p:nvPr>
             <p:ph idx="2" type="sldImg"/>
@@ -1840,7 +1640,7 @@
       </p:sp>
       <p:sp>
         <p:nvSpPr>
-          <p:cNvPr id="104" name="Google Shape;104;g2258d86762a_0_42:notes"/>
+          <p:cNvPr id="104" name="Google Shape;104;g2258d86762a_0_48:notes"/>
           <p:cNvSpPr txBox="1"/>
           <p:nvPr>
             <p:ph idx="1" type="body"/>
@@ -6644,7 +6444,7 @@
   <p:cSld>
     <p:spTree>
       <p:nvGrpSpPr>
-        <p:cNvPr id="111" name="Shape 111"/>
+        <p:cNvPr id="112" name="Shape 112"/>
         <p:cNvGrpSpPr/>
         <p:nvPr/>
       </p:nvGrpSpPr>
@@ -6658,7 +6458,7 @@
       </p:grpSpPr>
       <p:sp>
         <p:nvSpPr>
-          <p:cNvPr id="112" name="Google Shape;112;p22"/>
+          <p:cNvPr id="113" name="Google Shape;113;p22"/>
           <p:cNvSpPr txBox="1"/>
           <p:nvPr>
             <p:ph type="title"/>
@@ -6697,7 +6497,7 @@
       </p:sp>
       <p:sp>
         <p:nvSpPr>
-          <p:cNvPr id="113" name="Google Shape;113;p22"/>
+          <p:cNvPr id="114" name="Google Shape;114;p22"/>
           <p:cNvSpPr txBox="1"/>
           <p:nvPr>
             <p:ph idx="1" type="body"/>
@@ -6736,7 +6536,7 @@
       </p:sp>
       <p:pic>
         <p:nvPicPr>
-          <p:cNvPr id="114" name="Google Shape;114;p22"/>
+          <p:cNvPr id="115" name="Google Shape;115;p22"/>
           <p:cNvPicPr preferRelativeResize="0"/>
           <p:nvPr/>
         </p:nvPicPr>
@@ -6762,296 +6562,6 @@
           </a:ln>
         </p:spPr>
       </p:pic>
-    </p:spTree>
-  </p:cSld>
-  <p:clrMapOvr>
-    <a:masterClrMapping/>
-  </p:clrMapOvr>
-</p:sld>
-</file>
-
-<file path=ppt/slides/slide11.xml><?xml version="1.0" encoding="utf-8"?>
-<p:sld xmlns:a="http://schemas.openxmlformats.org/drawingml/2006/main" xmlns:r="http://schemas.openxmlformats.org/officeDocument/2006/relationships" xmlns:mc="http://schemas.openxmlformats.org/markup-compatibility/2006" xmlns:mv="urn:schemas-microsoft-com:mac:vml" xmlns:p="http://schemas.openxmlformats.org/presentationml/2006/main" xmlns:c="http://schemas.openxmlformats.org/drawingml/2006/chart" xmlns:dgm="http://schemas.openxmlformats.org/drawingml/2006/diagram" xmlns:o="urn:schemas-microsoft-com:office:office" xmlns:v="urn:schemas-microsoft-com:vml" xmlns:pvml="urn:schemas-microsoft-com:office:powerpoint" xmlns:com="http://schemas.openxmlformats.org/drawingml/2006/compatibility" xmlns:p14="http://schemas.microsoft.com/office/powerpoint/2010/main" xmlns:p15="http://schemas.microsoft.com/office/powerpoint/2012/main" xmlns:ahyp="http://schemas.microsoft.com/office/drawing/2018/hyperlinkcolor">
-  <p:cSld>
-    <p:spTree>
-      <p:nvGrpSpPr>
-        <p:cNvPr id="118" name="Shape 118"/>
-        <p:cNvGrpSpPr/>
-        <p:nvPr/>
-      </p:nvGrpSpPr>
-      <p:grpSpPr>
-        <a:xfrm>
-          <a:off x="0" y="0"/>
-          <a:ext cx="0" cy="0"/>
-          <a:chOff x="0" y="0"/>
-          <a:chExt cx="0" cy="0"/>
-        </a:xfrm>
-      </p:grpSpPr>
-      <p:sp>
-        <p:nvSpPr>
-          <p:cNvPr id="119" name="Google Shape;119;p23"/>
-          <p:cNvSpPr txBox="1"/>
-          <p:nvPr>
-            <p:ph type="title"/>
-          </p:nvPr>
-        </p:nvSpPr>
-        <p:spPr>
-          <a:xfrm>
-            <a:off x="311700" y="445025"/>
-            <a:ext cx="8520600" cy="572700"/>
-          </a:xfrm>
-          <a:prstGeom prst="rect">
-            <a:avLst/>
-          </a:prstGeom>
-        </p:spPr>
-        <p:txBody>
-          <a:bodyPr anchorCtr="0" anchor="t" bIns="91425" lIns="91425" spcFirstLastPara="1" rIns="91425" wrap="square" tIns="91425">
-            <a:normAutofit fontScale="90000"/>
-          </a:bodyPr>
-          <a:lstStyle/>
-          <a:p>
-            <a:pPr indent="0" lvl="0" marL="0" rtl="0" algn="l">
-              <a:spcBef>
-                <a:spcPts val="0"/>
-              </a:spcBef>
-              <a:spcAft>
-                <a:spcPts val="0"/>
-              </a:spcAft>
-              <a:buNone/>
-            </a:pPr>
-            <a:r>
-              <a:t/>
-            </a:r>
-            <a:endParaRPr/>
-          </a:p>
-        </p:txBody>
-      </p:sp>
-      <p:sp>
-        <p:nvSpPr>
-          <p:cNvPr id="120" name="Google Shape;120;p23"/>
-          <p:cNvSpPr txBox="1"/>
-          <p:nvPr>
-            <p:ph idx="1" type="body"/>
-          </p:nvPr>
-        </p:nvSpPr>
-        <p:spPr>
-          <a:xfrm>
-            <a:off x="311700" y="1152475"/>
-            <a:ext cx="8520600" cy="3416400"/>
-          </a:xfrm>
-          <a:prstGeom prst="rect">
-            <a:avLst/>
-          </a:prstGeom>
-        </p:spPr>
-        <p:txBody>
-          <a:bodyPr anchorCtr="0" anchor="t" bIns="91425" lIns="91425" spcFirstLastPara="1" rIns="91425" wrap="square" tIns="91425">
-            <a:normAutofit/>
-          </a:bodyPr>
-          <a:lstStyle/>
-          <a:p>
-            <a:pPr indent="0" lvl="0" marL="0" rtl="0" algn="l">
-              <a:spcBef>
-                <a:spcPts val="0"/>
-              </a:spcBef>
-              <a:spcAft>
-                <a:spcPts val="1200"/>
-              </a:spcAft>
-              <a:buNone/>
-            </a:pPr>
-            <a:r>
-              <a:t/>
-            </a:r>
-            <a:endParaRPr/>
-          </a:p>
-        </p:txBody>
-      </p:sp>
-      <p:pic>
-        <p:nvPicPr>
-          <p:cNvPr id="121" name="Google Shape;121;p23"/>
-          <p:cNvPicPr preferRelativeResize="0"/>
-          <p:nvPr/>
-        </p:nvPicPr>
-        <p:blipFill>
-          <a:blip r:embed="rId3">
-            <a:alphaModFix/>
-          </a:blip>
-          <a:stretch>
-            <a:fillRect/>
-          </a:stretch>
-        </p:blipFill>
-        <p:spPr>
-          <a:xfrm>
-            <a:off x="1220391" y="0"/>
-            <a:ext cx="6703219" cy="5143500"/>
-          </a:xfrm>
-          <a:prstGeom prst="rect">
-            <a:avLst/>
-          </a:prstGeom>
-          <a:noFill/>
-          <a:ln>
-            <a:noFill/>
-          </a:ln>
-        </p:spPr>
-      </p:pic>
-    </p:spTree>
-  </p:cSld>
-  <p:clrMapOvr>
-    <a:masterClrMapping/>
-  </p:clrMapOvr>
-</p:sld>
-</file>
-
-<file path=ppt/slides/slide12.xml><?xml version="1.0" encoding="utf-8"?>
-<p:sld xmlns:a="http://schemas.openxmlformats.org/drawingml/2006/main" xmlns:r="http://schemas.openxmlformats.org/officeDocument/2006/relationships" xmlns:mc="http://schemas.openxmlformats.org/markup-compatibility/2006" xmlns:mv="urn:schemas-microsoft-com:mac:vml" xmlns:p="http://schemas.openxmlformats.org/presentationml/2006/main" xmlns:c="http://schemas.openxmlformats.org/drawingml/2006/chart" xmlns:dgm="http://schemas.openxmlformats.org/drawingml/2006/diagram" xmlns:o="urn:schemas-microsoft-com:office:office" xmlns:v="urn:schemas-microsoft-com:vml" xmlns:pvml="urn:schemas-microsoft-com:office:powerpoint" xmlns:com="http://schemas.openxmlformats.org/drawingml/2006/compatibility" xmlns:p14="http://schemas.microsoft.com/office/powerpoint/2010/main" xmlns:p15="http://schemas.microsoft.com/office/powerpoint/2012/main" xmlns:ahyp="http://schemas.microsoft.com/office/drawing/2018/hyperlinkcolor">
-  <p:cSld>
-    <p:spTree>
-      <p:nvGrpSpPr>
-        <p:cNvPr id="125" name="Shape 125"/>
-        <p:cNvGrpSpPr/>
-        <p:nvPr/>
-      </p:nvGrpSpPr>
-      <p:grpSpPr>
-        <a:xfrm>
-          <a:off x="0" y="0"/>
-          <a:ext cx="0" cy="0"/>
-          <a:chOff x="0" y="0"/>
-          <a:chExt cx="0" cy="0"/>
-        </a:xfrm>
-      </p:grpSpPr>
-      <p:sp>
-        <p:nvSpPr>
-          <p:cNvPr id="126" name="Google Shape;126;p24"/>
-          <p:cNvSpPr txBox="1"/>
-          <p:nvPr>
-            <p:ph type="title"/>
-          </p:nvPr>
-        </p:nvSpPr>
-        <p:spPr>
-          <a:xfrm>
-            <a:off x="311700" y="445025"/>
-            <a:ext cx="8520600" cy="572700"/>
-          </a:xfrm>
-          <a:prstGeom prst="rect">
-            <a:avLst/>
-          </a:prstGeom>
-        </p:spPr>
-        <p:txBody>
-          <a:bodyPr anchorCtr="0" anchor="t" bIns="91425" lIns="91425" spcFirstLastPara="1" rIns="91425" wrap="square" tIns="91425">
-            <a:normAutofit fontScale="90000"/>
-          </a:bodyPr>
-          <a:lstStyle/>
-          <a:p>
-            <a:pPr indent="0" lvl="0" marL="0" rtl="0" algn="l">
-              <a:spcBef>
-                <a:spcPts val="0"/>
-              </a:spcBef>
-              <a:spcAft>
-                <a:spcPts val="0"/>
-              </a:spcAft>
-              <a:buNone/>
-            </a:pPr>
-            <a:r>
-              <a:rPr lang="en"/>
-              <a:t>NumPy - Exercise 2</a:t>
-            </a:r>
-            <a:endParaRPr/>
-          </a:p>
-        </p:txBody>
-      </p:sp>
-      <p:sp>
-        <p:nvSpPr>
-          <p:cNvPr id="127" name="Google Shape;127;p24"/>
-          <p:cNvSpPr txBox="1"/>
-          <p:nvPr>
-            <p:ph idx="1" type="body"/>
-          </p:nvPr>
-        </p:nvSpPr>
-        <p:spPr>
-          <a:xfrm>
-            <a:off x="311700" y="1152475"/>
-            <a:ext cx="8520600" cy="3416400"/>
-          </a:xfrm>
-          <a:prstGeom prst="rect">
-            <a:avLst/>
-          </a:prstGeom>
-        </p:spPr>
-        <p:txBody>
-          <a:bodyPr anchorCtr="0" anchor="t" bIns="91425" lIns="91425" spcFirstLastPara="1" rIns="91425" wrap="square" tIns="91425">
-            <a:normAutofit/>
-          </a:bodyPr>
-          <a:lstStyle/>
-          <a:p>
-            <a:pPr indent="0" lvl="0" marL="0" rtl="0" algn="l">
-              <a:spcBef>
-                <a:spcPts val="0"/>
-              </a:spcBef>
-              <a:spcAft>
-                <a:spcPts val="0"/>
-              </a:spcAft>
-              <a:buNone/>
-            </a:pPr>
-            <a:r>
-              <a:t/>
-            </a:r>
-            <a:endParaRPr/>
-          </a:p>
-          <a:p>
-            <a:pPr indent="0" lvl="0" marL="0" rtl="0" algn="l">
-              <a:spcBef>
-                <a:spcPts val="1200"/>
-              </a:spcBef>
-              <a:spcAft>
-                <a:spcPts val="0"/>
-              </a:spcAft>
-              <a:buNone/>
-            </a:pPr>
-            <a:r>
-              <a:rPr lang="en"/>
-              <a:t>Link: </a:t>
-            </a:r>
-            <a:r>
-              <a:rPr lang="en" u="sng">
-                <a:solidFill>
-                  <a:schemeClr val="hlink"/>
-                </a:solidFill>
-                <a:hlinkClick r:id="rId3"/>
-              </a:rPr>
-              <a:t>https://docs.google.com/document/d/1y4swlg6SCWCAI8e1DMFVGWaTOO6n28DICzsmdllhgF4/edit?usp=sharing</a:t>
-            </a:r>
-            <a:endParaRPr/>
-          </a:p>
-          <a:p>
-            <a:pPr indent="0" lvl="0" marL="0" rtl="0" algn="l">
-              <a:spcBef>
-                <a:spcPts val="1200"/>
-              </a:spcBef>
-              <a:spcAft>
-                <a:spcPts val="0"/>
-              </a:spcAft>
-              <a:buNone/>
-            </a:pPr>
-            <a:r>
-              <a:t/>
-            </a:r>
-            <a:endParaRPr/>
-          </a:p>
-          <a:p>
-            <a:pPr indent="0" lvl="0" marL="0" rtl="0" algn="l">
-              <a:spcBef>
-                <a:spcPts val="1200"/>
-              </a:spcBef>
-              <a:spcAft>
-                <a:spcPts val="1200"/>
-              </a:spcAft>
-              <a:buNone/>
-            </a:pPr>
-            <a:r>
-              <a:t/>
-            </a:r>
-            <a:endParaRPr/>
-          </a:p>
-        </p:txBody>
-      </p:sp>
     </p:spTree>
   </p:cSld>
   <p:clrMapOvr>
@@ -7956,7 +7466,7 @@
             </a:pPr>
             <a:r>
               <a:rPr lang="en"/>
-              <a:t>NumPy Exercise 1</a:t>
+              <a:t>NumPy - Stacking</a:t>
             </a:r>
             <a:endParaRPr/>
           </a:p>
@@ -8020,37 +7530,13 @@
                 <a:spcPts val="1200"/>
               </a:spcBef>
               <a:spcAft>
-                <a:spcPts val="0"/>
+                <a:spcPts val="1200"/>
               </a:spcAft>
               <a:buNone/>
             </a:pPr>
             <a:r>
               <a:rPr lang="en"/>
-              <a:t>Link: </a:t>
-            </a:r>
-            <a:r>
-              <a:rPr lang="en" u="sng">
-                <a:solidFill>
-                  <a:schemeClr val="hlink"/>
-                </a:solidFill>
-                <a:hlinkClick r:id="rId3"/>
-              </a:rPr>
-              <a:t>https://docs.google.com/document/d/1uK0l73SvjYT66CqQt9MQJa5vJ_tya8KG1z2eVShma7M/edit?usp=sharing</a:t>
-            </a:r>
-            <a:endParaRPr/>
-          </a:p>
-          <a:p>
-            <a:pPr indent="0" lvl="0" marL="0" rtl="0" algn="l">
-              <a:spcBef>
-                <a:spcPts val="1200"/>
-              </a:spcBef>
-              <a:spcAft>
-                <a:spcPts val="1200"/>
-              </a:spcAft>
-              <a:buNone/>
-            </a:pPr>
-            <a:r>
-              <a:t/>
+              <a:t>NumPy provides functions to vertically stack arrays as rows or horizontally stack arrays as columns. </a:t>
             </a:r>
             <a:endParaRPr/>
           </a:p>
@@ -8114,8 +7600,7 @@
               <a:buNone/>
             </a:pPr>
             <a:r>
-              <a:rPr lang="en"/>
-              <a:t>NumPy - Stacking</a:t>
+              <a:t/>
             </a:r>
             <a:endParaRPr/>
           </a:p>
@@ -8149,7 +7634,7 @@
                 <a:spcPts val="0"/>
               </a:spcBef>
               <a:spcAft>
-                <a:spcPts val="0"/>
+                <a:spcPts val="1200"/>
               </a:spcAft>
               <a:buNone/>
             </a:pPr>
@@ -8158,39 +7643,36 @@
             </a:r>
             <a:endParaRPr/>
           </a:p>
-          <a:p>
-            <a:pPr indent="0" lvl="0" marL="0" rtl="0" algn="l">
-              <a:spcBef>
-                <a:spcPts val="1200"/>
-              </a:spcBef>
-              <a:spcAft>
-                <a:spcPts val="0"/>
-              </a:spcAft>
-              <a:buNone/>
-            </a:pPr>
-            <a:r>
-              <a:t/>
-            </a:r>
-            <a:endParaRPr/>
-          </a:p>
-          <a:p>
-            <a:pPr indent="0" lvl="0" marL="0" rtl="0" algn="l">
-              <a:spcBef>
-                <a:spcPts val="1200"/>
-              </a:spcBef>
-              <a:spcAft>
-                <a:spcPts val="1200"/>
-              </a:spcAft>
-              <a:buNone/>
-            </a:pPr>
-            <a:r>
-              <a:rPr lang="en"/>
-              <a:t>NumPy provides functions to vertically stack arrays as rows or horizontally stack arrays as columns. </a:t>
-            </a:r>
-            <a:endParaRPr/>
-          </a:p>
         </p:txBody>
       </p:sp>
+      <p:pic>
+        <p:nvPicPr>
+          <p:cNvPr id="108" name="Google Shape;108;p21"/>
+          <p:cNvPicPr preferRelativeResize="0"/>
+          <p:nvPr/>
+        </p:nvPicPr>
+        <p:blipFill>
+          <a:blip r:embed="rId3">
+            <a:alphaModFix/>
+          </a:blip>
+          <a:stretch>
+            <a:fillRect/>
+          </a:stretch>
+        </p:blipFill>
+        <p:spPr>
+          <a:xfrm>
+            <a:off x="1220391" y="0"/>
+            <a:ext cx="6703219" cy="5143500"/>
+          </a:xfrm>
+          <a:prstGeom prst="rect">
+            <a:avLst/>
+          </a:prstGeom>
+          <a:noFill/>
+          <a:ln>
+            <a:noFill/>
+          </a:ln>
+        </p:spPr>
+      </p:pic>
     </p:spTree>
   </p:cSld>
   <p:clrMapOvr>

</xml_diff>